<commit_message>
create event and other stuff
</commit_message>
<xml_diff>
--- a/EventLite.pptx
+++ b/EventLite.pptx
@@ -5946,19 +5946,7 @@
                   <a:cs typeface="Roboto Condensed"/>
                   <a:sym typeface="Roboto Condensed"/>
                 </a:rPr>
-                <a:t>3. </a:t>
-              </a:r>
-              <a:r>
-                <a:rPr lang="en" dirty="0" smtClean="0">
-                  <a:solidFill>
-                    <a:srgbClr val="FFFFFF"/>
-                  </a:solidFill>
-                  <a:latin typeface="Roboto Condensed"/>
-                  <a:ea typeface="Roboto Condensed"/>
-                  <a:cs typeface="Roboto Condensed"/>
-                  <a:sym typeface="Roboto Condensed"/>
-                </a:rPr>
-                <a:t>Resource for politcal events</a:t>
+                <a:t>3. Resource for politcal events</a:t>
               </a:r>
               <a:endParaRPr dirty="0">
                 <a:solidFill>
@@ -8692,6 +8680,13 @@
   <p:clrMapOvr>
     <a:masterClrMapping/>
   </p:clrMapOvr>
+  <p:timing>
+    <p:tnLst>
+      <p:par>
+        <p:cTn id="1" dur="indefinite" restart="never" nodeType="tmRoot"/>
+      </p:par>
+    </p:tnLst>
+  </p:timing>
 </p:sld>
 </file>
 
@@ -8776,7 +8771,9 @@
               <a:buNone/>
             </a:pPr>
             <a:r>
-              <a:rPr lang="en" dirty="0" smtClean="0"/>
+              <a:rPr lang="en" dirty="0" smtClean="0">
+                <a:hlinkClick r:id="rId4"/>
+              </a:rPr>
               <a:t>H E R E</a:t>
             </a:r>
             <a:endParaRPr dirty="0"/>
@@ -8830,6 +8827,13 @@
   <p:clrMapOvr>
     <a:masterClrMapping/>
   </p:clrMapOvr>
+  <p:timing>
+    <p:tnLst>
+      <p:par>
+        <p:cTn id="1" dur="indefinite" restart="never" nodeType="tmRoot"/>
+      </p:par>
+    </p:tnLst>
+  </p:timing>
 </p:sld>
 </file>
 
@@ -8943,12 +8947,9 @@
             </a:pPr>
             <a:r>
               <a:rPr lang="en-US" sz="1400" dirty="0" smtClean="0"/>
-              <a:t>T</a:t>
+              <a:t>Handlebars + servers</a:t>
             </a:r>
-            <a:r>
-              <a:rPr lang="en" sz="1400" dirty="0" smtClean="0"/>
-              <a:t>ext here</a:t>
-            </a:r>
+            <a:endParaRPr lang="en" sz="1400" dirty="0" smtClean="0"/>
           </a:p>
           <a:p>
             <a:pPr marL="342900" indent="-342900">
@@ -9868,6 +9869,13 @@
   <p:clrMapOvr>
     <a:masterClrMapping/>
   </p:clrMapOvr>
+  <p:timing>
+    <p:tnLst>
+      <p:par>
+        <p:cTn id="1" dur="indefinite" restart="never" nodeType="tmRoot"/>
+      </p:par>
+    </p:tnLst>
+  </p:timing>
 </p:sld>
 </file>
 
@@ -10039,11 +10047,19 @@
             </a:pPr>
             <a:r>
               <a:rPr lang="en-US" sz="1200" dirty="0" smtClean="0"/>
-              <a:t>T</a:t>
+              <a:t>RSVP function, ticketing function, reservations, </a:t>
             </a:r>
             <a:r>
-              <a:rPr lang="en" sz="1200" dirty="0" smtClean="0"/>
-              <a:t>ext here</a:t>
+              <a:rPr lang="en-US" sz="1200" dirty="0" err="1" smtClean="0"/>
+              <a:t>etc</a:t>
+            </a:r>
+            <a:r>
+              <a:rPr lang="en-US" sz="1200" dirty="0" smtClean="0"/>
+              <a:t> </a:t>
+            </a:r>
+            <a:r>
+              <a:rPr lang="en-US" sz="1200" dirty="0" err="1" smtClean="0"/>
+              <a:t>etc</a:t>
             </a:r>
             <a:endParaRPr sz="1200" dirty="0"/>
           </a:p>
@@ -10101,7 +10117,15 @@
             </a:pPr>
             <a:r>
               <a:rPr lang="en-US" sz="1200" dirty="0" smtClean="0"/>
-              <a:t>Text here</a:t>
+              <a:t>Initially we were supposed to populate event info from </a:t>
+            </a:r>
+            <a:r>
+              <a:rPr lang="en-US" sz="1200" dirty="0" err="1" smtClean="0"/>
+              <a:t>EventBrite</a:t>
+            </a:r>
+            <a:r>
+              <a:rPr lang="en-US" sz="1200" dirty="0" smtClean="0"/>
+              <a:t>, but problems arose…</a:t>
             </a:r>
             <a:endParaRPr sz="1200" dirty="0"/>
           </a:p>
@@ -10197,7 +10221,11 @@
             </a:pPr>
             <a:r>
               <a:rPr lang="en" b="1" dirty="0" smtClean="0"/>
-              <a:t>Google API</a:t>
+              <a:t>Google </a:t>
+            </a:r>
+            <a:r>
+              <a:rPr lang="en" b="1" dirty="0" smtClean="0"/>
+              <a:t>Maps API</a:t>
             </a:r>
             <a:endParaRPr b="1" dirty="0"/>
           </a:p>
@@ -10213,11 +10241,7 @@
             </a:pPr>
             <a:r>
               <a:rPr lang="en-US" sz="1200" dirty="0" smtClean="0"/>
-              <a:t>T</a:t>
-            </a:r>
-            <a:r>
-              <a:rPr lang="en" sz="1200" dirty="0" smtClean="0"/>
-              <a:t>ext here</a:t>
+              <a:t>For directions to the event!</a:t>
             </a:r>
             <a:endParaRPr sz="1200" dirty="0"/>
           </a:p>
@@ -10275,11 +10299,13 @@
             </a:pPr>
             <a:r>
               <a:rPr lang="en-US" sz="1200" dirty="0" smtClean="0"/>
-              <a:t>T</a:t>
+              <a:t>Could be more responsive – currently not mobile-friendly </a:t>
             </a:r>
             <a:r>
-              <a:rPr lang="en" sz="1200" dirty="0" smtClean="0"/>
-              <a:t>ext here</a:t>
+              <a:rPr lang="en-US" sz="1200" dirty="0" smtClean="0">
+                <a:sym typeface="Wingdings" panose="05000000000000000000" pitchFamily="2" charset="2"/>
+              </a:rPr>
+              <a:t></a:t>
             </a:r>
             <a:endParaRPr sz="1200" dirty="0"/>
           </a:p>

</xml_diff>